<commit_message>
Added new class files
</commit_message>
<xml_diff>
--- a/outline_and_powerpoint/Ayoola_js_tutorial.pptx
+++ b/outline_and_powerpoint/Ayoola_js_tutorial.pptx
@@ -5,7 +5,7 @@
     <p:sldMasterId id="2147483780" r:id="rId1"/>
   </p:sldMasterIdLst>
   <p:notesMasterIdLst>
-    <p:notesMasterId r:id="rId7"/>
+    <p:notesMasterId r:id="rId9"/>
   </p:notesMasterIdLst>
   <p:sldIdLst>
     <p:sldId id="256" r:id="rId2"/>
@@ -13,6 +13,8 @@
     <p:sldId id="258" r:id="rId4"/>
     <p:sldId id="259" r:id="rId5"/>
     <p:sldId id="260" r:id="rId6"/>
+    <p:sldId id="261" r:id="rId7"/>
+    <p:sldId id="262" r:id="rId8"/>
   </p:sldIdLst>
   <p:sldSz cx="9144000" cy="6858000" type="screen4x3"/>
   <p:notesSz cx="6858000" cy="9144000"/>
@@ -196,7 +198,7 @@
           <a:p>
             <a:fld id="{E72F39FB-4F22-45FD-A82F-55B9BE69B551}" type="datetimeFigureOut">
               <a:rPr lang="en-US" smtClean="0"/>
-              <a:t>8/22/2022</a:t>
+              <a:t>8/24/2022</a:t>
             </a:fld>
             <a:endParaRPr lang="en-US"/>
           </a:p>
@@ -891,6 +893,184 @@
             <a:fld id="{ED57A7CA-3862-40C6-B16C-B53A02E26CAB}" type="slidenum">
               <a:rPr lang="en-US" smtClean="0"/>
               <a:t>5</a:t>
+            </a:fld>
+            <a:endParaRPr lang="en-US"/>
+          </a:p>
+        </p:txBody>
+      </p:sp>
+    </p:spTree>
+    <p:extLst>
+      <p:ext uri="{BB962C8B-B14F-4D97-AF65-F5344CB8AC3E}">
+        <p14:creationId xmlns:p14="http://schemas.microsoft.com/office/powerpoint/2010/main" val="4171798273"/>
+      </p:ext>
+    </p:extLst>
+  </p:cSld>
+  <p:clrMapOvr>
+    <a:masterClrMapping/>
+  </p:clrMapOvr>
+</p:notes>
+</file>
+
+<file path=ppt/notesSlides/notesSlide6.xml><?xml version="1.0" encoding="utf-8"?>
+<p:notes xmlns:a="http://schemas.openxmlformats.org/drawingml/2006/main" xmlns:r="http://schemas.openxmlformats.org/officeDocument/2006/relationships" xmlns:p="http://schemas.openxmlformats.org/presentationml/2006/main">
+  <p:cSld>
+    <p:spTree>
+      <p:nvGrpSpPr>
+        <p:cNvPr id="1" name=""/>
+        <p:cNvGrpSpPr/>
+        <p:nvPr/>
+      </p:nvGrpSpPr>
+      <p:grpSpPr>
+        <a:xfrm>
+          <a:off x="0" y="0"/>
+          <a:ext cx="0" cy="0"/>
+          <a:chOff x="0" y="0"/>
+          <a:chExt cx="0" cy="0"/>
+        </a:xfrm>
+      </p:grpSpPr>
+      <p:sp>
+        <p:nvSpPr>
+          <p:cNvPr id="2" name="Slide Image Placeholder 1"/>
+          <p:cNvSpPr>
+            <a:spLocks noGrp="1" noRot="1" noChangeAspect="1"/>
+          </p:cNvSpPr>
+          <p:nvPr>
+            <p:ph type="sldImg"/>
+          </p:nvPr>
+        </p:nvSpPr>
+        <p:spPr>
+          <a:xfrm>
+            <a:off x="1143000" y="685800"/>
+            <a:ext cx="4572000" cy="3429000"/>
+          </a:xfrm>
+        </p:spPr>
+      </p:sp>
+      <p:sp>
+        <p:nvSpPr>
+          <p:cNvPr id="3" name="Notes Placeholder 2"/>
+          <p:cNvSpPr>
+            <a:spLocks noGrp="1"/>
+          </p:cNvSpPr>
+          <p:nvPr>
+            <p:ph type="body" idx="1"/>
+          </p:nvPr>
+        </p:nvSpPr>
+        <p:spPr/>
+        <p:txBody>
+          <a:bodyPr/>
+          <a:lstStyle/>
+          <a:p>
+            <a:endParaRPr lang="en-US" dirty="0"/>
+          </a:p>
+        </p:txBody>
+      </p:sp>
+      <p:sp>
+        <p:nvSpPr>
+          <p:cNvPr id="4" name="Slide Number Placeholder 3"/>
+          <p:cNvSpPr>
+            <a:spLocks noGrp="1"/>
+          </p:cNvSpPr>
+          <p:nvPr>
+            <p:ph type="sldNum" sz="quarter" idx="10"/>
+          </p:nvPr>
+        </p:nvSpPr>
+        <p:spPr/>
+        <p:txBody>
+          <a:bodyPr/>
+          <a:lstStyle/>
+          <a:p>
+            <a:fld id="{ED57A7CA-3862-40C6-B16C-B53A02E26CAB}" type="slidenum">
+              <a:rPr lang="en-US" smtClean="0"/>
+              <a:t>6</a:t>
+            </a:fld>
+            <a:endParaRPr lang="en-US"/>
+          </a:p>
+        </p:txBody>
+      </p:sp>
+    </p:spTree>
+    <p:extLst>
+      <p:ext uri="{BB962C8B-B14F-4D97-AF65-F5344CB8AC3E}">
+        <p14:creationId xmlns:p14="http://schemas.microsoft.com/office/powerpoint/2010/main" val="4171798273"/>
+      </p:ext>
+    </p:extLst>
+  </p:cSld>
+  <p:clrMapOvr>
+    <a:masterClrMapping/>
+  </p:clrMapOvr>
+</p:notes>
+</file>
+
+<file path=ppt/notesSlides/notesSlide7.xml><?xml version="1.0" encoding="utf-8"?>
+<p:notes xmlns:a="http://schemas.openxmlformats.org/drawingml/2006/main" xmlns:r="http://schemas.openxmlformats.org/officeDocument/2006/relationships" xmlns:p="http://schemas.openxmlformats.org/presentationml/2006/main">
+  <p:cSld>
+    <p:spTree>
+      <p:nvGrpSpPr>
+        <p:cNvPr id="1" name=""/>
+        <p:cNvGrpSpPr/>
+        <p:nvPr/>
+      </p:nvGrpSpPr>
+      <p:grpSpPr>
+        <a:xfrm>
+          <a:off x="0" y="0"/>
+          <a:ext cx="0" cy="0"/>
+          <a:chOff x="0" y="0"/>
+          <a:chExt cx="0" cy="0"/>
+        </a:xfrm>
+      </p:grpSpPr>
+      <p:sp>
+        <p:nvSpPr>
+          <p:cNvPr id="2" name="Slide Image Placeholder 1"/>
+          <p:cNvSpPr>
+            <a:spLocks noGrp="1" noRot="1" noChangeAspect="1"/>
+          </p:cNvSpPr>
+          <p:nvPr>
+            <p:ph type="sldImg"/>
+          </p:nvPr>
+        </p:nvSpPr>
+        <p:spPr>
+          <a:xfrm>
+            <a:off x="1143000" y="685800"/>
+            <a:ext cx="4572000" cy="3429000"/>
+          </a:xfrm>
+        </p:spPr>
+      </p:sp>
+      <p:sp>
+        <p:nvSpPr>
+          <p:cNvPr id="3" name="Notes Placeholder 2"/>
+          <p:cNvSpPr>
+            <a:spLocks noGrp="1"/>
+          </p:cNvSpPr>
+          <p:nvPr>
+            <p:ph type="body" idx="1"/>
+          </p:nvPr>
+        </p:nvSpPr>
+        <p:spPr/>
+        <p:txBody>
+          <a:bodyPr/>
+          <a:lstStyle/>
+          <a:p>
+            <a:endParaRPr lang="en-US" dirty="0"/>
+          </a:p>
+        </p:txBody>
+      </p:sp>
+      <p:sp>
+        <p:nvSpPr>
+          <p:cNvPr id="4" name="Slide Number Placeholder 3"/>
+          <p:cNvSpPr>
+            <a:spLocks noGrp="1"/>
+          </p:cNvSpPr>
+          <p:nvPr>
+            <p:ph type="sldNum" sz="quarter" idx="10"/>
+          </p:nvPr>
+        </p:nvSpPr>
+        <p:spPr/>
+        <p:txBody>
+          <a:bodyPr/>
+          <a:lstStyle/>
+          <a:p>
+            <a:fld id="{ED57A7CA-3862-40C6-B16C-B53A02E26CAB}" type="slidenum">
+              <a:rPr lang="en-US" smtClean="0"/>
+              <a:t>7</a:t>
             </a:fld>
             <a:endParaRPr lang="en-US"/>
           </a:p>
@@ -3666,7 +3846,7 @@
           <a:p>
             <a:fld id="{6C391D4C-9280-4343-992F-BAACC7D4D726}" type="datetimeFigureOut">
               <a:rPr lang="en-US" smtClean="0"/>
-              <a:t>8/22/2022</a:t>
+              <a:t>8/24/2022</a:t>
             </a:fld>
             <a:endParaRPr lang="en-US"/>
           </a:p>
@@ -3951,7 +4131,7 @@
           <a:p>
             <a:fld id="{6C391D4C-9280-4343-992F-BAACC7D4D726}" type="datetimeFigureOut">
               <a:rPr lang="en-US" smtClean="0"/>
-              <a:t>8/22/2022</a:t>
+              <a:t>8/24/2022</a:t>
             </a:fld>
             <a:endParaRPr lang="en-US"/>
           </a:p>
@@ -4126,7 +4306,7 @@
           <a:p>
             <a:fld id="{6C391D4C-9280-4343-992F-BAACC7D4D726}" type="datetimeFigureOut">
               <a:rPr lang="en-US" smtClean="0"/>
-              <a:t>8/22/2022</a:t>
+              <a:t>8/24/2022</a:t>
             </a:fld>
             <a:endParaRPr lang="en-US"/>
           </a:p>
@@ -4291,7 +4471,7 @@
           <a:p>
             <a:fld id="{6C391D4C-9280-4343-992F-BAACC7D4D726}" type="datetimeFigureOut">
               <a:rPr lang="en-US" smtClean="0"/>
-              <a:t>8/22/2022</a:t>
+              <a:t>8/24/2022</a:t>
             </a:fld>
             <a:endParaRPr lang="en-US"/>
           </a:p>
@@ -4532,7 +4712,7 @@
           <a:p>
             <a:fld id="{6C391D4C-9280-4343-992F-BAACC7D4D726}" type="datetimeFigureOut">
               <a:rPr lang="en-US" smtClean="0"/>
-              <a:t>8/22/2022</a:t>
+              <a:t>8/24/2022</a:t>
             </a:fld>
             <a:endParaRPr lang="en-US"/>
           </a:p>
@@ -4645,7 +4825,7 @@
           <a:p>
             <a:fld id="{6C391D4C-9280-4343-992F-BAACC7D4D726}" type="datetimeFigureOut">
               <a:rPr lang="en-US" smtClean="0"/>
-              <a:t>8/22/2022</a:t>
+              <a:t>8/24/2022</a:t>
             </a:fld>
             <a:endParaRPr lang="en-US"/>
           </a:p>
@@ -5184,7 +5364,7 @@
           <a:p>
             <a:fld id="{6C391D4C-9280-4343-992F-BAACC7D4D726}" type="datetimeFigureOut">
               <a:rPr lang="en-US" smtClean="0"/>
-              <a:t>8/22/2022</a:t>
+              <a:t>8/24/2022</a:t>
             </a:fld>
             <a:endParaRPr lang="en-US"/>
           </a:p>
@@ -5297,7 +5477,7 @@
           <a:p>
             <a:fld id="{6C391D4C-9280-4343-992F-BAACC7D4D726}" type="datetimeFigureOut">
               <a:rPr lang="en-US" smtClean="0"/>
-              <a:t>8/22/2022</a:t>
+              <a:t>8/24/2022</a:t>
             </a:fld>
             <a:endParaRPr lang="en-US"/>
           </a:p>
@@ -5387,7 +5567,7 @@
           <a:p>
             <a:fld id="{6C391D4C-9280-4343-992F-BAACC7D4D726}" type="datetimeFigureOut">
               <a:rPr lang="en-US" smtClean="0"/>
-              <a:t>8/22/2022</a:t>
+              <a:t>8/24/2022</a:t>
             </a:fld>
             <a:endParaRPr lang="en-US"/>
           </a:p>
@@ -8038,7 +8218,7 @@
           <a:p>
             <a:fld id="{6C391D4C-9280-4343-992F-BAACC7D4D726}" type="datetimeFigureOut">
               <a:rPr lang="en-US" smtClean="0"/>
-              <a:t>8/22/2022</a:t>
+              <a:t>8/24/2022</a:t>
             </a:fld>
             <a:endParaRPr lang="en-US"/>
           </a:p>
@@ -11250,7 +11430,7 @@
           <a:p>
             <a:fld id="{6C391D4C-9280-4343-992F-BAACC7D4D726}" type="datetimeFigureOut">
               <a:rPr lang="en-US" smtClean="0"/>
-              <a:t>8/22/2022</a:t>
+              <a:t>8/24/2022</a:t>
             </a:fld>
             <a:endParaRPr lang="en-US"/>
           </a:p>
@@ -14072,7 +14252,7 @@
           <a:p>
             <a:fld id="{6C391D4C-9280-4343-992F-BAACC7D4D726}" type="datetimeFigureOut">
               <a:rPr lang="en-US" smtClean="0"/>
-              <a:t>8/22/2022</a:t>
+              <a:t>8/24/2022</a:t>
             </a:fld>
             <a:endParaRPr lang="en-US"/>
           </a:p>
@@ -14814,11 +14994,7 @@
             </a:r>
             <a:r>
               <a:rPr lang="en-US" dirty="0" smtClean="0"/>
-              <a:t>file</a:t>
-            </a:r>
-            <a:r>
-              <a:rPr lang="en-US" dirty="0" smtClean="0"/>
-              <a:t>?	</a:t>
+              <a:t>file?	</a:t>
             </a:r>
             <a:endParaRPr lang="en-US" dirty="0"/>
           </a:p>
@@ -14861,15 +15037,7 @@
             </a:br>
             <a:r>
               <a:rPr lang="en-US" dirty="0" smtClean="0"/>
-              <a:t>This can be accomplished in </a:t>
-            </a:r>
-            <a:r>
-              <a:rPr lang="en-US" dirty="0" smtClean="0"/>
-              <a:t>two </a:t>
-            </a:r>
-            <a:r>
-              <a:rPr lang="en-US" dirty="0" smtClean="0"/>
-              <a:t>ways</a:t>
+              <a:t>This can be accomplished in two ways</a:t>
             </a:r>
           </a:p>
           <a:p>
@@ -14901,23 +15069,7 @@
           <a:p>
             <a:r>
               <a:rPr lang="en-US" dirty="0" smtClean="0"/>
-              <a:t>Locally </a:t>
-            </a:r>
-            <a:r>
-              <a:rPr lang="en-US" dirty="0" smtClean="0"/>
-              <a:t>on your </a:t>
-            </a:r>
-            <a:r>
-              <a:rPr lang="en-US" dirty="0" smtClean="0"/>
-              <a:t>d</a:t>
-            </a:r>
-            <a:r>
-              <a:rPr lang="en-US" dirty="0" smtClean="0"/>
-              <a:t>evices .</a:t>
-            </a:r>
-            <a:r>
-              <a:rPr lang="en-US" dirty="0" smtClean="0"/>
-              <a:t/>
+              <a:t>Locally on your devices .</a:t>
             </a:r>
             <a:br>
               <a:rPr lang="en-US" dirty="0" smtClean="0"/>
@@ -14960,10 +15112,6 @@
             <a:r>
               <a:rPr lang="en-US" dirty="0" smtClean="0"/>
               <a:t>)</a:t>
-            </a:r>
-            <a:r>
-              <a:rPr lang="en-US" dirty="0" smtClean="0"/>
-              <a:t/>
             </a:r>
             <a:br>
               <a:rPr lang="en-US" dirty="0" smtClean="0"/>
@@ -15035,11 +15183,7 @@
           <a:p>
             <a:r>
               <a:rPr lang="en-US" dirty="0" smtClean="0"/>
-              <a:t>Commenting JS code</a:t>
-            </a:r>
-            <a:r>
-              <a:rPr lang="en-US" dirty="0" smtClean="0"/>
-              <a:t>	</a:t>
+              <a:t>Commenting JS code	</a:t>
             </a:r>
             <a:endParaRPr lang="en-US" dirty="0"/>
           </a:p>
@@ -15172,7 +15316,6 @@
               <a:rPr lang="en-US" dirty="0"/>
               <a:t>Data types and variables</a:t>
             </a:r>
-            <a:endParaRPr lang="en-US" dirty="0"/>
           </a:p>
         </p:txBody>
       </p:sp>
@@ -15250,10 +15393,6 @@
               <a:rPr lang="en-US" dirty="0" smtClean="0"/>
               <a:t> are containers or declarations used in storing data types.</a:t>
             </a:r>
-            <a:r>
-              <a:rPr lang="en-US" dirty="0" smtClean="0"/>
-              <a:t/>
-            </a:r>
             <a:br>
               <a:rPr lang="en-US" dirty="0" smtClean="0"/>
             </a:br>
@@ -15269,6 +15408,278 @@
     <p:extLst>
       <p:ext uri="{BB962C8B-B14F-4D97-AF65-F5344CB8AC3E}">
         <p14:creationId xmlns:p14="http://schemas.microsoft.com/office/powerpoint/2010/main" val="189353781"/>
+      </p:ext>
+    </p:extLst>
+  </p:cSld>
+  <p:clrMapOvr>
+    <a:masterClrMapping/>
+  </p:clrMapOvr>
+  <p:timing>
+    <p:tnLst>
+      <p:par>
+        <p:cTn id="1" dur="indefinite" restart="never" nodeType="tmRoot"/>
+      </p:par>
+    </p:tnLst>
+  </p:timing>
+</p:sld>
+</file>
+
+<file path=ppt/slides/slide6.xml><?xml version="1.0" encoding="utf-8"?>
+<p:sld xmlns:a="http://schemas.openxmlformats.org/drawingml/2006/main" xmlns:r="http://schemas.openxmlformats.org/officeDocument/2006/relationships" xmlns:p="http://schemas.openxmlformats.org/presentationml/2006/main">
+  <p:cSld>
+    <p:spTree>
+      <p:nvGrpSpPr>
+        <p:cNvPr id="1" name=""/>
+        <p:cNvGrpSpPr/>
+        <p:nvPr/>
+      </p:nvGrpSpPr>
+      <p:grpSpPr>
+        <a:xfrm>
+          <a:off x="0" y="0"/>
+          <a:ext cx="0" cy="0"/>
+          <a:chOff x="0" y="0"/>
+          <a:chExt cx="0" cy="0"/>
+        </a:xfrm>
+      </p:grpSpPr>
+      <p:sp>
+        <p:nvSpPr>
+          <p:cNvPr id="2" name="Title 1"/>
+          <p:cNvSpPr>
+            <a:spLocks noGrp="1"/>
+          </p:cNvSpPr>
+          <p:nvPr>
+            <p:ph type="title"/>
+          </p:nvPr>
+        </p:nvSpPr>
+        <p:spPr/>
+        <p:txBody>
+          <a:bodyPr>
+            <a:normAutofit fontScale="90000"/>
+          </a:bodyPr>
+          <a:lstStyle/>
+          <a:p>
+            <a:r>
+              <a:rPr lang="en-US" dirty="0" smtClean="0"/>
+              <a:t>BASIC MATHEMATICAL OPERATIONS</a:t>
+            </a:r>
+            <a:endParaRPr lang="en-US" dirty="0"/>
+          </a:p>
+        </p:txBody>
+      </p:sp>
+      <p:sp>
+        <p:nvSpPr>
+          <p:cNvPr id="3" name="Subtitle 2"/>
+          <p:cNvSpPr>
+            <a:spLocks noGrp="1"/>
+          </p:cNvSpPr>
+          <p:nvPr>
+            <p:ph idx="1"/>
+          </p:nvPr>
+        </p:nvSpPr>
+        <p:spPr/>
+        <p:txBody>
+          <a:bodyPr>
+            <a:normAutofit/>
+          </a:bodyPr>
+          <a:lstStyle/>
+          <a:p>
+            <a:pPr marL="68580" indent="0">
+              <a:buNone/>
+            </a:pPr>
+            <a:r>
+              <a:rPr lang="en-US" dirty="0" smtClean="0"/>
+              <a:t>  </a:t>
+            </a:r>
+            <a:r>
+              <a:rPr lang="en-US" dirty="0"/>
+              <a:t>In </a:t>
+            </a:r>
+            <a:r>
+              <a:rPr lang="en-US" dirty="0" err="1"/>
+              <a:t>Javascript</a:t>
+            </a:r>
+            <a:r>
+              <a:rPr lang="en-US" dirty="0"/>
+              <a:t>, </a:t>
+            </a:r>
+            <a:r>
+              <a:rPr lang="en-US" dirty="0" smtClean="0"/>
+              <a:t>basic mathematical operations such as Addition, Subtraction, Multiplication, division and more can be executed within your code.</a:t>
+            </a:r>
+          </a:p>
+          <a:p>
+            <a:pPr marL="68580" indent="0">
+              <a:buNone/>
+            </a:pPr>
+            <a:r>
+              <a:rPr lang="en-US" dirty="0" smtClean="0"/>
+              <a:t/>
+            </a:r>
+            <a:br>
+              <a:rPr lang="en-US" dirty="0" smtClean="0"/>
+            </a:br>
+            <a:r>
+              <a:rPr lang="en-US" dirty="0" smtClean="0"/>
+              <a:t>Its important to note that mathematical operations in </a:t>
+            </a:r>
+            <a:r>
+              <a:rPr lang="en-US" dirty="0" err="1"/>
+              <a:t>J</a:t>
+            </a:r>
+            <a:r>
+              <a:rPr lang="en-US" dirty="0" err="1" smtClean="0"/>
+              <a:t>avascript</a:t>
+            </a:r>
+            <a:r>
+              <a:rPr lang="en-US" dirty="0" smtClean="0"/>
+              <a:t> are also governed by BODMAS!</a:t>
+            </a:r>
+            <a:endParaRPr lang="en-US" dirty="0"/>
+          </a:p>
+        </p:txBody>
+      </p:sp>
+    </p:spTree>
+    <p:extLst>
+      <p:ext uri="{BB962C8B-B14F-4D97-AF65-F5344CB8AC3E}">
+        <p14:creationId xmlns:p14="http://schemas.microsoft.com/office/powerpoint/2010/main" val="2394427186"/>
+      </p:ext>
+    </p:extLst>
+  </p:cSld>
+  <p:clrMapOvr>
+    <a:masterClrMapping/>
+  </p:clrMapOvr>
+  <p:timing>
+    <p:tnLst>
+      <p:par>
+        <p:cTn id="1" dur="indefinite" restart="never" nodeType="tmRoot"/>
+      </p:par>
+    </p:tnLst>
+  </p:timing>
+</p:sld>
+</file>
+
+<file path=ppt/slides/slide7.xml><?xml version="1.0" encoding="utf-8"?>
+<p:sld xmlns:a="http://schemas.openxmlformats.org/drawingml/2006/main" xmlns:r="http://schemas.openxmlformats.org/officeDocument/2006/relationships" xmlns:p="http://schemas.openxmlformats.org/presentationml/2006/main">
+  <p:cSld>
+    <p:spTree>
+      <p:nvGrpSpPr>
+        <p:cNvPr id="1" name=""/>
+        <p:cNvGrpSpPr/>
+        <p:nvPr/>
+      </p:nvGrpSpPr>
+      <p:grpSpPr>
+        <a:xfrm>
+          <a:off x="0" y="0"/>
+          <a:ext cx="0" cy="0"/>
+          <a:chOff x="0" y="0"/>
+          <a:chExt cx="0" cy="0"/>
+        </a:xfrm>
+      </p:grpSpPr>
+      <p:sp>
+        <p:nvSpPr>
+          <p:cNvPr id="2" name="Title 1"/>
+          <p:cNvSpPr>
+            <a:spLocks noGrp="1"/>
+          </p:cNvSpPr>
+          <p:nvPr>
+            <p:ph type="title"/>
+          </p:nvPr>
+        </p:nvSpPr>
+        <p:spPr/>
+        <p:txBody>
+          <a:bodyPr>
+            <a:normAutofit fontScale="90000"/>
+          </a:bodyPr>
+          <a:lstStyle/>
+          <a:p>
+            <a:r>
+              <a:rPr lang="en-US" dirty="0" smtClean="0"/>
+              <a:t>BASIC OPERATIONS ON STRINGS</a:t>
+            </a:r>
+            <a:endParaRPr lang="en-US" dirty="0"/>
+          </a:p>
+        </p:txBody>
+      </p:sp>
+      <p:sp>
+        <p:nvSpPr>
+          <p:cNvPr id="3" name="Subtitle 2"/>
+          <p:cNvSpPr>
+            <a:spLocks noGrp="1"/>
+          </p:cNvSpPr>
+          <p:nvPr>
+            <p:ph idx="1"/>
+          </p:nvPr>
+        </p:nvSpPr>
+        <p:spPr/>
+        <p:txBody>
+          <a:bodyPr>
+            <a:normAutofit/>
+          </a:bodyPr>
+          <a:lstStyle/>
+          <a:p>
+            <a:pPr marL="68580" indent="0">
+              <a:buNone/>
+            </a:pPr>
+            <a:r>
+              <a:rPr lang="en-US" dirty="0" smtClean="0"/>
+              <a:t>  </a:t>
+            </a:r>
+            <a:r>
+              <a:rPr lang="en-US" dirty="0" smtClean="0"/>
+              <a:t>Similar to performing mathematical operations on numbers, operations can also be performed on </a:t>
+            </a:r>
+            <a:r>
+              <a:rPr lang="en-US" b="1" dirty="0" smtClean="0"/>
+              <a:t>string</a:t>
+            </a:r>
+            <a:r>
+              <a:rPr lang="en-US" dirty="0" smtClean="0"/>
+              <a:t> </a:t>
+            </a:r>
+            <a:r>
+              <a:rPr lang="en-US" dirty="0" err="1" smtClean="0"/>
+              <a:t>datatypes</a:t>
+            </a:r>
+            <a:r>
+              <a:rPr lang="en-US" dirty="0" smtClean="0"/>
+              <a:t>.</a:t>
+            </a:r>
+          </a:p>
+          <a:p>
+            <a:pPr marL="68580" indent="0">
+              <a:buNone/>
+            </a:pPr>
+            <a:r>
+              <a:rPr lang="en-US" dirty="0" smtClean="0"/>
+              <a:t/>
+            </a:r>
+            <a:br>
+              <a:rPr lang="en-US" dirty="0" smtClean="0"/>
+            </a:br>
+            <a:r>
+              <a:rPr lang="en-US" dirty="0" smtClean="0"/>
+              <a:t>Some of these includes, </a:t>
+            </a:r>
+            <a:r>
+              <a:rPr lang="en-US" dirty="0" err="1" smtClean="0"/>
+              <a:t>concatenatation</a:t>
+            </a:r>
+            <a:r>
+              <a:rPr lang="en-US" dirty="0" smtClean="0"/>
+              <a:t>, quoting quotes</a:t>
+            </a:r>
+            <a:r>
+              <a:rPr lang="en-US" smtClean="0"/>
+              <a:t>, controlling log outputs … </a:t>
+            </a:r>
+            <a:endParaRPr lang="en-US" dirty="0"/>
+          </a:p>
+        </p:txBody>
+      </p:sp>
+    </p:spTree>
+    <p:extLst>
+      <p:ext uri="{BB962C8B-B14F-4D97-AF65-F5344CB8AC3E}">
+        <p14:creationId xmlns:p14="http://schemas.microsoft.com/office/powerpoint/2010/main" val="3705562701"/>
       </p:ext>
     </p:extLst>
   </p:cSld>

</xml_diff>